<commit_message>
fixed goof on slides for 3/22 on DP, greedy
</commit_message>
<xml_diff>
--- a/slides/DP_greedy_intro_part1.pptx
+++ b/slides/DP_greedy_intro_part1.pptx
@@ -9089,7 +9089,7 @@
                 <a:ea typeface="ＭＳ Ｐゴシック" charset="0"/>
                 <a:cs typeface="ＭＳ Ｐゴシック" charset="0"/>
               </a:rPr>
-              <a:t>Greedy choice #3:  highest profit-to-value ratio</a:t>
+              <a:t>Greedy choice #3:  highest value-to-weight ratio</a:t>
             </a:r>
           </a:p>
           <a:p>
@@ -11203,7 +11203,7 @@
           <a:graphicData uri="http://schemas.openxmlformats.org/presentationml/2006/ole">
             <mc:AlternateContent xmlns:mc="http://schemas.openxmlformats.org/markup-compatibility/2006">
               <mc:Choice xmlns:v="urn:schemas-microsoft-com:vml" Requires="v">
-                <p:oleObj spid="_x0000_s2071" name="Equation" r:id="rId3" imgW="596900" imgH="457200" progId="Equation.3">
+                <p:oleObj spid="_x0000_s2074" name="Equation" r:id="rId3" imgW="596900" imgH="457200" progId="Equation.3">
                   <p:embed/>
                 </p:oleObj>
               </mc:Choice>
@@ -14171,7 +14171,7 @@
           <a:p>
             <a:r>
               <a:rPr lang="en-US" dirty="0"/>
-              <a:t>Good when sub-problems do not overlap, when they’re independent</a:t>
+              <a:t>DP is good when sub-problems overlap, when they’re not independent</a:t>
             </a:r>
           </a:p>
           <a:p>
@@ -41047,7 +41047,7 @@
             </a:r>
             <a:r>
               <a:rPr lang="en-US" sz="2800" dirty="0"/>
-              <a:t>. </a:t>
+              <a:t> </a:t>
             </a:r>
           </a:p>
           <a:p>
@@ -42104,7 +42104,7 @@
           <a:graphicData uri="http://schemas.openxmlformats.org/presentationml/2006/ole">
             <mc:AlternateContent xmlns:mc="http://schemas.openxmlformats.org/markup-compatibility/2006">
               <mc:Choice xmlns:v="urn:schemas-microsoft-com:vml" Requires="v">
-                <p:oleObj spid="_x0000_s1069" name="Equation" r:id="rId4" imgW="482391" imgH="431613" progId="Equation.3">
+                <p:oleObj spid="_x0000_s1075" name="Equation" r:id="rId4" imgW="482391" imgH="431613" progId="Equation.3">
                   <p:embed/>
                 </p:oleObj>
               </mc:Choice>
@@ -42174,7 +42174,7 @@
           <a:graphicData uri="http://schemas.openxmlformats.org/presentationml/2006/ole">
             <mc:AlternateContent xmlns:mc="http://schemas.openxmlformats.org/markup-compatibility/2006">
               <mc:Choice xmlns:v="urn:schemas-microsoft-com:vml" Requires="v">
-                <p:oleObj spid="_x0000_s1070" name="Equation" r:id="rId6" imgW="1422400" imgH="457200" progId="Equation.3">
+                <p:oleObj spid="_x0000_s1076" name="Equation" r:id="rId6" imgW="1422400" imgH="457200" progId="Equation.3">
                   <p:embed/>
                 </p:oleObj>
               </mc:Choice>

</xml_diff>